<commit_message>
Quick update to ppt
</commit_message>
<xml_diff>
--- a/Where to be to be Happy.pptx
+++ b/Where to be to be Happy.pptx
@@ -7,13 +7,14 @@
   <p:sldIdLst>
     <p:sldId id="256" r:id="rId2"/>
     <p:sldId id="257" r:id="rId3"/>
-    <p:sldId id="258" r:id="rId4"/>
-    <p:sldId id="265" r:id="rId5"/>
-    <p:sldId id="259" r:id="rId6"/>
-    <p:sldId id="261" r:id="rId7"/>
-    <p:sldId id="262" r:id="rId8"/>
-    <p:sldId id="263" r:id="rId9"/>
-    <p:sldId id="264" r:id="rId10"/>
+    <p:sldId id="266" r:id="rId4"/>
+    <p:sldId id="258" r:id="rId5"/>
+    <p:sldId id="265" r:id="rId6"/>
+    <p:sldId id="259" r:id="rId7"/>
+    <p:sldId id="261" r:id="rId8"/>
+    <p:sldId id="262" r:id="rId9"/>
+    <p:sldId id="263" r:id="rId10"/>
+    <p:sldId id="264" r:id="rId11"/>
   </p:sldIdLst>
   <p:sldSz cx="12192000" cy="6858000"/>
   <p:notesSz cx="6858000" cy="9144000"/>
@@ -112,6 +113,11 @@
       </a:defRPr>
     </a:lvl9pPr>
   </p:defaultTextStyle>
+  <p:extLst>
+    <p:ext uri="{EFAFB233-063F-42B5-8137-9DF3F51BA10A}">
+      <p15:sldGuideLst xmlns:p15="http://schemas.microsoft.com/office/powerpoint/2012/main"/>
+    </p:ext>
+  </p:extLst>
 </p:presentation>
 </file>
 
@@ -7698,6 +7704,236 @@
 </p:sld>
 </file>
 
+<file path=ppt/slides/slide10.xml><?xml version="1.0" encoding="utf-8"?>
+<p:sld xmlns:a="http://schemas.openxmlformats.org/drawingml/2006/main" xmlns:r="http://schemas.openxmlformats.org/officeDocument/2006/relationships" xmlns:p="http://schemas.openxmlformats.org/presentationml/2006/main">
+  <p:cSld>
+    <p:spTree>
+      <p:nvGrpSpPr>
+        <p:cNvPr id="1" name=""/>
+        <p:cNvGrpSpPr/>
+        <p:nvPr/>
+      </p:nvGrpSpPr>
+      <p:grpSpPr>
+        <a:xfrm>
+          <a:off x="0" y="0"/>
+          <a:ext cx="0" cy="0"/>
+          <a:chOff x="0" y="0"/>
+          <a:chExt cx="0" cy="0"/>
+        </a:xfrm>
+      </p:grpSpPr>
+      <p:sp>
+        <p:nvSpPr>
+          <p:cNvPr id="4" name="Title 1">
+            <a:extLst>
+              <a:ext uri="{FF2B5EF4-FFF2-40B4-BE49-F238E27FC236}">
+                <a16:creationId xmlns:a16="http://schemas.microsoft.com/office/drawing/2014/main" id="{C5F5D50A-A888-4660-B446-D73AEF6D270F}"/>
+              </a:ext>
+            </a:extLst>
+          </p:cNvPr>
+          <p:cNvSpPr txBox="1">
+            <a:spLocks/>
+          </p:cNvSpPr>
+          <p:nvPr/>
+        </p:nvSpPr>
+        <p:spPr>
+          <a:xfrm>
+            <a:off x="2058087" y="325061"/>
+            <a:ext cx="8911687" cy="1280890"/>
+          </a:xfrm>
+          <a:prstGeom prst="rect">
+            <a:avLst/>
+          </a:prstGeom>
+        </p:spPr>
+        <p:txBody>
+          <a:bodyPr vert="horz" lIns="91440" tIns="45720" rIns="91440" bIns="45720" rtlCol="0" anchor="t">
+            <a:normAutofit/>
+          </a:bodyPr>
+          <a:lstStyle>
+            <a:lvl1pPr algn="l" defTabSz="457200" rtl="0" eaLnBrk="1" latinLnBrk="0" hangingPunct="1">
+              <a:spcBef>
+                <a:spcPct val="0"/>
+              </a:spcBef>
+              <a:buNone/>
+              <a:defRPr sz="3600" kern="1200">
+                <a:solidFill>
+                  <a:schemeClr val="accent2">
+                    <a:lumMod val="75000"/>
+                  </a:schemeClr>
+                </a:solidFill>
+                <a:latin typeface="+mj-lt"/>
+                <a:ea typeface="+mj-ea"/>
+                <a:cs typeface="+mj-cs"/>
+              </a:defRPr>
+            </a:lvl1pPr>
+            <a:lvl2pPr eaLnBrk="1" hangingPunct="1">
+              <a:defRPr>
+                <a:solidFill>
+                  <a:schemeClr val="tx2"/>
+                </a:solidFill>
+              </a:defRPr>
+            </a:lvl2pPr>
+            <a:lvl3pPr eaLnBrk="1" hangingPunct="1">
+              <a:defRPr>
+                <a:solidFill>
+                  <a:schemeClr val="tx2"/>
+                </a:solidFill>
+              </a:defRPr>
+            </a:lvl3pPr>
+            <a:lvl4pPr eaLnBrk="1" hangingPunct="1">
+              <a:defRPr>
+                <a:solidFill>
+                  <a:schemeClr val="tx2"/>
+                </a:solidFill>
+              </a:defRPr>
+            </a:lvl4pPr>
+            <a:lvl5pPr eaLnBrk="1" hangingPunct="1">
+              <a:defRPr>
+                <a:solidFill>
+                  <a:schemeClr val="tx2"/>
+                </a:solidFill>
+              </a:defRPr>
+            </a:lvl5pPr>
+            <a:lvl6pPr eaLnBrk="1" hangingPunct="1">
+              <a:defRPr>
+                <a:solidFill>
+                  <a:schemeClr val="tx2"/>
+                </a:solidFill>
+              </a:defRPr>
+            </a:lvl6pPr>
+            <a:lvl7pPr eaLnBrk="1" hangingPunct="1">
+              <a:defRPr>
+                <a:solidFill>
+                  <a:schemeClr val="tx2"/>
+                </a:solidFill>
+              </a:defRPr>
+            </a:lvl7pPr>
+            <a:lvl8pPr eaLnBrk="1" hangingPunct="1">
+              <a:defRPr>
+                <a:solidFill>
+                  <a:schemeClr val="tx2"/>
+                </a:solidFill>
+              </a:defRPr>
+            </a:lvl8pPr>
+            <a:lvl9pPr eaLnBrk="1" hangingPunct="1">
+              <a:defRPr>
+                <a:solidFill>
+                  <a:schemeClr val="tx2"/>
+                </a:solidFill>
+              </a:defRPr>
+            </a:lvl9pPr>
+          </a:lstStyle>
+          <a:p>
+            <a:r>
+              <a:rPr lang="en-US"/>
+              <a:t>Happiness Factors</a:t>
+            </a:r>
+            <a:endParaRPr lang="en-US" dirty="0"/>
+          </a:p>
+        </p:txBody>
+      </p:sp>
+      <p:pic>
+        <p:nvPicPr>
+          <p:cNvPr id="6" name="Picture 5">
+            <a:extLst>
+              <a:ext uri="{FF2B5EF4-FFF2-40B4-BE49-F238E27FC236}">
+                <a16:creationId xmlns:a16="http://schemas.microsoft.com/office/drawing/2014/main" id="{AA1C97D2-9930-400C-86F5-315A5D71DFE8}"/>
+              </a:ext>
+            </a:extLst>
+          </p:cNvPr>
+          <p:cNvPicPr>
+            <a:picLocks noChangeAspect="1"/>
+          </p:cNvPicPr>
+          <p:nvPr/>
+        </p:nvPicPr>
+        <p:blipFill>
+          <a:blip r:embed="rId2"/>
+          <a:stretch>
+            <a:fillRect/>
+          </a:stretch>
+        </p:blipFill>
+        <p:spPr>
+          <a:xfrm>
+            <a:off x="2352648" y="1047201"/>
+            <a:ext cx="3743352" cy="2762270"/>
+          </a:xfrm>
+          <a:prstGeom prst="rect">
+            <a:avLst/>
+          </a:prstGeom>
+        </p:spPr>
+      </p:pic>
+      <p:pic>
+        <p:nvPicPr>
+          <p:cNvPr id="8" name="Picture 7">
+            <a:extLst>
+              <a:ext uri="{FF2B5EF4-FFF2-40B4-BE49-F238E27FC236}">
+                <a16:creationId xmlns:a16="http://schemas.microsoft.com/office/drawing/2014/main" id="{5779DBBE-1A39-4500-88CF-3571580DF0BB}"/>
+              </a:ext>
+            </a:extLst>
+          </p:cNvPr>
+          <p:cNvPicPr>
+            <a:picLocks noChangeAspect="1"/>
+          </p:cNvPicPr>
+          <p:nvPr/>
+        </p:nvPicPr>
+        <p:blipFill>
+          <a:blip r:embed="rId3"/>
+          <a:stretch>
+            <a:fillRect/>
+          </a:stretch>
+        </p:blipFill>
+        <p:spPr>
+          <a:xfrm>
+            <a:off x="6559567" y="1195962"/>
+            <a:ext cx="3773516" cy="2613509"/>
+          </a:xfrm>
+          <a:prstGeom prst="rect">
+            <a:avLst/>
+          </a:prstGeom>
+        </p:spPr>
+      </p:pic>
+      <p:pic>
+        <p:nvPicPr>
+          <p:cNvPr id="10" name="Picture 9">
+            <a:extLst>
+              <a:ext uri="{FF2B5EF4-FFF2-40B4-BE49-F238E27FC236}">
+                <a16:creationId xmlns:a16="http://schemas.microsoft.com/office/drawing/2014/main" id="{DD2A3C0E-A8F6-4CFA-A9C4-8E137D4CA43F}"/>
+              </a:ext>
+            </a:extLst>
+          </p:cNvPr>
+          <p:cNvPicPr>
+            <a:picLocks noChangeAspect="1"/>
+          </p:cNvPicPr>
+          <p:nvPr/>
+        </p:nvPicPr>
+        <p:blipFill>
+          <a:blip r:embed="rId4"/>
+          <a:stretch>
+            <a:fillRect/>
+          </a:stretch>
+        </p:blipFill>
+        <p:spPr>
+          <a:xfrm>
+            <a:off x="2314547" y="3967107"/>
+            <a:ext cx="3781453" cy="2692281"/>
+          </a:xfrm>
+          <a:prstGeom prst="rect">
+            <a:avLst/>
+          </a:prstGeom>
+        </p:spPr>
+      </p:pic>
+    </p:spTree>
+    <p:extLst>
+      <p:ext uri="{BB962C8B-B14F-4D97-AF65-F5344CB8AC3E}">
+        <p14:creationId xmlns:p14="http://schemas.microsoft.com/office/powerpoint/2010/main" val="3300619990"/>
+      </p:ext>
+    </p:extLst>
+  </p:cSld>
+  <p:clrMapOvr>
+    <a:masterClrMapping/>
+  </p:clrMapOvr>
+</p:sld>
+</file>
+
 <file path=ppt/slides/slide2.xml><?xml version="1.0" encoding="utf-8"?>
 <p:sld xmlns:a="http://schemas.openxmlformats.org/drawingml/2006/main" xmlns:r="http://schemas.openxmlformats.org/officeDocument/2006/relationships" xmlns:p="http://schemas.openxmlformats.org/presentationml/2006/main">
   <p:cSld>
@@ -7794,15 +8030,7 @@
             </a:r>
             <a:r>
               <a:rPr lang="en-US" sz="2000" dirty="0"/>
-              <a:t> files, no </a:t>
-            </a:r>
-            <a:r>
-              <a:rPr lang="en-US" sz="2000" dirty="0" err="1"/>
-              <a:t>apis</a:t>
-            </a:r>
-            <a:r>
-              <a:rPr lang="en-US" sz="2000" dirty="0"/>
-              <a:t> easily available.</a:t>
+              <a:t> files, no APIs easily available.</a:t>
             </a:r>
           </a:p>
           <a:p>
@@ -7859,12 +8087,8 @@
           <a:p>
             <a:pPr lvl="1"/>
             <a:r>
-              <a:rPr lang="en-US" sz="1800" dirty="0" err="1"/>
-              <a:t>Contatenating</a:t>
-            </a:r>
-            <a:r>
               <a:rPr lang="en-US" sz="1800" dirty="0"/>
-              <a:t> </a:t>
+              <a:t>Concatenating </a:t>
             </a:r>
             <a:r>
               <a:rPr lang="en-US" sz="1800" dirty="0" err="1"/>
@@ -7875,12 +8099,8 @@
           <a:p>
             <a:pPr lvl="1"/>
             <a:r>
-              <a:rPr lang="en-US" sz="1800" dirty="0" err="1"/>
-              <a:t>Mergining</a:t>
-            </a:r>
-            <a:r>
               <a:rPr lang="en-US" sz="1800" dirty="0"/>
-              <a:t> </a:t>
+              <a:t>Merging </a:t>
             </a:r>
             <a:r>
               <a:rPr lang="en-US" sz="1800" dirty="0" err="1"/>
@@ -7945,6 +8165,94 @@
           <p:cNvPr id="2" name="Title 1">
             <a:extLst>
               <a:ext uri="{FF2B5EF4-FFF2-40B4-BE49-F238E27FC236}">
+                <a16:creationId xmlns:a16="http://schemas.microsoft.com/office/drawing/2014/main" id="{148DA3A2-4256-44B0-A7B0-5D36313FD24E}"/>
+              </a:ext>
+            </a:extLst>
+          </p:cNvPr>
+          <p:cNvSpPr>
+            <a:spLocks noGrp="1"/>
+          </p:cNvSpPr>
+          <p:nvPr>
+            <p:ph type="title"/>
+          </p:nvPr>
+        </p:nvSpPr>
+        <p:spPr/>
+        <p:txBody>
+          <a:bodyPr/>
+          <a:lstStyle/>
+          <a:p>
+            <a:r>
+              <a:rPr lang="en-US" dirty="0"/>
+              <a:t>Data</a:t>
+            </a:r>
+          </a:p>
+        </p:txBody>
+      </p:sp>
+      <p:pic>
+        <p:nvPicPr>
+          <p:cNvPr id="5" name="Picture 4">
+            <a:extLst>
+              <a:ext uri="{FF2B5EF4-FFF2-40B4-BE49-F238E27FC236}">
+                <a16:creationId xmlns:a16="http://schemas.microsoft.com/office/drawing/2014/main" id="{193D62BB-8A32-47A8-A293-707D1CAC49CD}"/>
+              </a:ext>
+            </a:extLst>
+          </p:cNvPr>
+          <p:cNvPicPr>
+            <a:picLocks noChangeAspect="1"/>
+          </p:cNvPicPr>
+          <p:nvPr/>
+        </p:nvPicPr>
+        <p:blipFill>
+          <a:blip r:embed="rId2"/>
+          <a:stretch>
+            <a:fillRect/>
+          </a:stretch>
+        </p:blipFill>
+        <p:spPr>
+          <a:xfrm>
+            <a:off x="416048" y="1727065"/>
+            <a:ext cx="11463421" cy="4381532"/>
+          </a:xfrm>
+          <a:prstGeom prst="rect">
+            <a:avLst/>
+          </a:prstGeom>
+        </p:spPr>
+      </p:pic>
+    </p:spTree>
+    <p:extLst>
+      <p:ext uri="{BB962C8B-B14F-4D97-AF65-F5344CB8AC3E}">
+        <p14:creationId xmlns:p14="http://schemas.microsoft.com/office/powerpoint/2010/main" val="2453574815"/>
+      </p:ext>
+    </p:extLst>
+  </p:cSld>
+  <p:clrMapOvr>
+    <a:masterClrMapping/>
+  </p:clrMapOvr>
+</p:sld>
+</file>
+
+<file path=ppt/slides/slide4.xml><?xml version="1.0" encoding="utf-8"?>
+<p:sld xmlns:a="http://schemas.openxmlformats.org/drawingml/2006/main" xmlns:r="http://schemas.openxmlformats.org/officeDocument/2006/relationships" xmlns:p="http://schemas.openxmlformats.org/presentationml/2006/main">
+  <p:cSld>
+    <p:spTree>
+      <p:nvGrpSpPr>
+        <p:cNvPr id="1" name=""/>
+        <p:cNvGrpSpPr/>
+        <p:nvPr/>
+      </p:nvGrpSpPr>
+      <p:grpSpPr>
+        <a:xfrm>
+          <a:off x="0" y="0"/>
+          <a:ext cx="0" cy="0"/>
+          <a:chOff x="0" y="0"/>
+          <a:chExt cx="0" cy="0"/>
+        </a:xfrm>
+      </p:grpSpPr>
+      <p:sp>
+        <p:nvSpPr>
+          <p:cNvPr id="2" name="Title 1">
+            <a:extLst>
+              <a:ext uri="{FF2B5EF4-FFF2-40B4-BE49-F238E27FC236}">
                 <a16:creationId xmlns:a16="http://schemas.microsoft.com/office/drawing/2014/main" id="{CED2BDDF-DE2C-4BF8-8CE7-E11BB21E7D24}"/>
               </a:ext>
             </a:extLst>
@@ -8021,15 +8329,7 @@
             <a:pPr lvl="1"/>
             <a:r>
               <a:rPr lang="en-US" dirty="0"/>
-              <a:t>This allows to keep the notebooks to </a:t>
-            </a:r>
-            <a:r>
-              <a:rPr lang="en-US" dirty="0" err="1"/>
-              <a:t>maneageable</a:t>
-            </a:r>
-            <a:r>
-              <a:rPr lang="en-US" dirty="0"/>
-              <a:t> sizes</a:t>
+              <a:t>This allows to keep the notebooks to manageable sizes</a:t>
             </a:r>
           </a:p>
           <a:p>
@@ -8065,7 +8365,7 @@
 </p:sld>
 </file>
 
-<file path=ppt/slides/slide4.xml><?xml version="1.0" encoding="utf-8"?>
+<file path=ppt/slides/slide5.xml><?xml version="1.0" encoding="utf-8"?>
 <p:sld xmlns:a="http://schemas.openxmlformats.org/drawingml/2006/main" xmlns:r="http://schemas.openxmlformats.org/officeDocument/2006/relationships" xmlns:p="http://schemas.openxmlformats.org/presentationml/2006/main">
   <p:cSld>
     <p:spTree>
@@ -8152,7 +8452,7 @@
 </p:sld>
 </file>
 
-<file path=ppt/slides/slide5.xml><?xml version="1.0" encoding="utf-8"?>
+<file path=ppt/slides/slide6.xml><?xml version="1.0" encoding="utf-8"?>
 <p:sld xmlns:a="http://schemas.openxmlformats.org/drawingml/2006/main" xmlns:r="http://schemas.openxmlformats.org/officeDocument/2006/relationships" xmlns:p="http://schemas.openxmlformats.org/presentationml/2006/main">
   <p:cSld>
     <p:spTree>
@@ -8306,7 +8606,7 @@
 </p:sld>
 </file>
 
-<file path=ppt/slides/slide6.xml><?xml version="1.0" encoding="utf-8"?>
+<file path=ppt/slides/slide7.xml><?xml version="1.0" encoding="utf-8"?>
 <p:sld xmlns:a="http://schemas.openxmlformats.org/drawingml/2006/main" xmlns:r="http://schemas.openxmlformats.org/officeDocument/2006/relationships" xmlns:p="http://schemas.openxmlformats.org/presentationml/2006/main">
   <p:cSld>
     <p:spTree>
@@ -8460,7 +8760,7 @@
 </p:sld>
 </file>
 
-<file path=ppt/slides/slide7.xml><?xml version="1.0" encoding="utf-8"?>
+<file path=ppt/slides/slide8.xml><?xml version="1.0" encoding="utf-8"?>
 <p:sld xmlns:a="http://schemas.openxmlformats.org/drawingml/2006/main" xmlns:r="http://schemas.openxmlformats.org/officeDocument/2006/relationships" xmlns:p="http://schemas.openxmlformats.org/presentationml/2006/main">
   <p:cSld>
     <p:spTree>
@@ -9151,7 +9451,7 @@
 </p:sld>
 </file>
 
-<file path=ppt/slides/slide8.xml><?xml version="1.0" encoding="utf-8"?>
+<file path=ppt/slides/slide9.xml><?xml version="1.0" encoding="utf-8"?>
 <p:sld xmlns:a="http://schemas.openxmlformats.org/drawingml/2006/main" xmlns:r="http://schemas.openxmlformats.org/officeDocument/2006/relationships" xmlns:p="http://schemas.openxmlformats.org/presentationml/2006/main">
   <p:cSld>
     <p:spTree>
@@ -9324,236 +9624,6 @@
     <p:extLst>
       <p:ext uri="{BB962C8B-B14F-4D97-AF65-F5344CB8AC3E}">
         <p14:creationId xmlns:p14="http://schemas.microsoft.com/office/powerpoint/2010/main" val="701001830"/>
-      </p:ext>
-    </p:extLst>
-  </p:cSld>
-  <p:clrMapOvr>
-    <a:masterClrMapping/>
-  </p:clrMapOvr>
-</p:sld>
-</file>
-
-<file path=ppt/slides/slide9.xml><?xml version="1.0" encoding="utf-8"?>
-<p:sld xmlns:a="http://schemas.openxmlformats.org/drawingml/2006/main" xmlns:r="http://schemas.openxmlformats.org/officeDocument/2006/relationships" xmlns:p="http://schemas.openxmlformats.org/presentationml/2006/main">
-  <p:cSld>
-    <p:spTree>
-      <p:nvGrpSpPr>
-        <p:cNvPr id="1" name=""/>
-        <p:cNvGrpSpPr/>
-        <p:nvPr/>
-      </p:nvGrpSpPr>
-      <p:grpSpPr>
-        <a:xfrm>
-          <a:off x="0" y="0"/>
-          <a:ext cx="0" cy="0"/>
-          <a:chOff x="0" y="0"/>
-          <a:chExt cx="0" cy="0"/>
-        </a:xfrm>
-      </p:grpSpPr>
-      <p:sp>
-        <p:nvSpPr>
-          <p:cNvPr id="4" name="Title 1">
-            <a:extLst>
-              <a:ext uri="{FF2B5EF4-FFF2-40B4-BE49-F238E27FC236}">
-                <a16:creationId xmlns:a16="http://schemas.microsoft.com/office/drawing/2014/main" id="{C5F5D50A-A888-4660-B446-D73AEF6D270F}"/>
-              </a:ext>
-            </a:extLst>
-          </p:cNvPr>
-          <p:cNvSpPr txBox="1">
-            <a:spLocks/>
-          </p:cNvSpPr>
-          <p:nvPr/>
-        </p:nvSpPr>
-        <p:spPr>
-          <a:xfrm>
-            <a:off x="2058087" y="325061"/>
-            <a:ext cx="8911687" cy="1280890"/>
-          </a:xfrm>
-          <a:prstGeom prst="rect">
-            <a:avLst/>
-          </a:prstGeom>
-        </p:spPr>
-        <p:txBody>
-          <a:bodyPr vert="horz" lIns="91440" tIns="45720" rIns="91440" bIns="45720" rtlCol="0" anchor="t">
-            <a:normAutofit/>
-          </a:bodyPr>
-          <a:lstStyle>
-            <a:lvl1pPr algn="l" defTabSz="457200" rtl="0" eaLnBrk="1" latinLnBrk="0" hangingPunct="1">
-              <a:spcBef>
-                <a:spcPct val="0"/>
-              </a:spcBef>
-              <a:buNone/>
-              <a:defRPr sz="3600" kern="1200">
-                <a:solidFill>
-                  <a:schemeClr val="accent2">
-                    <a:lumMod val="75000"/>
-                  </a:schemeClr>
-                </a:solidFill>
-                <a:latin typeface="+mj-lt"/>
-                <a:ea typeface="+mj-ea"/>
-                <a:cs typeface="+mj-cs"/>
-              </a:defRPr>
-            </a:lvl1pPr>
-            <a:lvl2pPr eaLnBrk="1" hangingPunct="1">
-              <a:defRPr>
-                <a:solidFill>
-                  <a:schemeClr val="tx2"/>
-                </a:solidFill>
-              </a:defRPr>
-            </a:lvl2pPr>
-            <a:lvl3pPr eaLnBrk="1" hangingPunct="1">
-              <a:defRPr>
-                <a:solidFill>
-                  <a:schemeClr val="tx2"/>
-                </a:solidFill>
-              </a:defRPr>
-            </a:lvl3pPr>
-            <a:lvl4pPr eaLnBrk="1" hangingPunct="1">
-              <a:defRPr>
-                <a:solidFill>
-                  <a:schemeClr val="tx2"/>
-                </a:solidFill>
-              </a:defRPr>
-            </a:lvl4pPr>
-            <a:lvl5pPr eaLnBrk="1" hangingPunct="1">
-              <a:defRPr>
-                <a:solidFill>
-                  <a:schemeClr val="tx2"/>
-                </a:solidFill>
-              </a:defRPr>
-            </a:lvl5pPr>
-            <a:lvl6pPr eaLnBrk="1" hangingPunct="1">
-              <a:defRPr>
-                <a:solidFill>
-                  <a:schemeClr val="tx2"/>
-                </a:solidFill>
-              </a:defRPr>
-            </a:lvl6pPr>
-            <a:lvl7pPr eaLnBrk="1" hangingPunct="1">
-              <a:defRPr>
-                <a:solidFill>
-                  <a:schemeClr val="tx2"/>
-                </a:solidFill>
-              </a:defRPr>
-            </a:lvl7pPr>
-            <a:lvl8pPr eaLnBrk="1" hangingPunct="1">
-              <a:defRPr>
-                <a:solidFill>
-                  <a:schemeClr val="tx2"/>
-                </a:solidFill>
-              </a:defRPr>
-            </a:lvl8pPr>
-            <a:lvl9pPr eaLnBrk="1" hangingPunct="1">
-              <a:defRPr>
-                <a:solidFill>
-                  <a:schemeClr val="tx2"/>
-                </a:solidFill>
-              </a:defRPr>
-            </a:lvl9pPr>
-          </a:lstStyle>
-          <a:p>
-            <a:r>
-              <a:rPr lang="en-US"/>
-              <a:t>Happiness Factors</a:t>
-            </a:r>
-            <a:endParaRPr lang="en-US" dirty="0"/>
-          </a:p>
-        </p:txBody>
-      </p:sp>
-      <p:pic>
-        <p:nvPicPr>
-          <p:cNvPr id="6" name="Picture 5">
-            <a:extLst>
-              <a:ext uri="{FF2B5EF4-FFF2-40B4-BE49-F238E27FC236}">
-                <a16:creationId xmlns:a16="http://schemas.microsoft.com/office/drawing/2014/main" id="{AA1C97D2-9930-400C-86F5-315A5D71DFE8}"/>
-              </a:ext>
-            </a:extLst>
-          </p:cNvPr>
-          <p:cNvPicPr>
-            <a:picLocks noChangeAspect="1"/>
-          </p:cNvPicPr>
-          <p:nvPr/>
-        </p:nvPicPr>
-        <p:blipFill>
-          <a:blip r:embed="rId2"/>
-          <a:stretch>
-            <a:fillRect/>
-          </a:stretch>
-        </p:blipFill>
-        <p:spPr>
-          <a:xfrm>
-            <a:off x="2352648" y="1047201"/>
-            <a:ext cx="3743352" cy="2762270"/>
-          </a:xfrm>
-          <a:prstGeom prst="rect">
-            <a:avLst/>
-          </a:prstGeom>
-        </p:spPr>
-      </p:pic>
-      <p:pic>
-        <p:nvPicPr>
-          <p:cNvPr id="8" name="Picture 7">
-            <a:extLst>
-              <a:ext uri="{FF2B5EF4-FFF2-40B4-BE49-F238E27FC236}">
-                <a16:creationId xmlns:a16="http://schemas.microsoft.com/office/drawing/2014/main" id="{5779DBBE-1A39-4500-88CF-3571580DF0BB}"/>
-              </a:ext>
-            </a:extLst>
-          </p:cNvPr>
-          <p:cNvPicPr>
-            <a:picLocks noChangeAspect="1"/>
-          </p:cNvPicPr>
-          <p:nvPr/>
-        </p:nvPicPr>
-        <p:blipFill>
-          <a:blip r:embed="rId3"/>
-          <a:stretch>
-            <a:fillRect/>
-          </a:stretch>
-        </p:blipFill>
-        <p:spPr>
-          <a:xfrm>
-            <a:off x="6559567" y="1195962"/>
-            <a:ext cx="3773516" cy="2613509"/>
-          </a:xfrm>
-          <a:prstGeom prst="rect">
-            <a:avLst/>
-          </a:prstGeom>
-        </p:spPr>
-      </p:pic>
-      <p:pic>
-        <p:nvPicPr>
-          <p:cNvPr id="10" name="Picture 9">
-            <a:extLst>
-              <a:ext uri="{FF2B5EF4-FFF2-40B4-BE49-F238E27FC236}">
-                <a16:creationId xmlns:a16="http://schemas.microsoft.com/office/drawing/2014/main" id="{DD2A3C0E-A8F6-4CFA-A9C4-8E137D4CA43F}"/>
-              </a:ext>
-            </a:extLst>
-          </p:cNvPr>
-          <p:cNvPicPr>
-            <a:picLocks noChangeAspect="1"/>
-          </p:cNvPicPr>
-          <p:nvPr/>
-        </p:nvPicPr>
-        <p:blipFill>
-          <a:blip r:embed="rId4"/>
-          <a:stretch>
-            <a:fillRect/>
-          </a:stretch>
-        </p:blipFill>
-        <p:spPr>
-          <a:xfrm>
-            <a:off x="2314547" y="3967107"/>
-            <a:ext cx="3781453" cy="2692281"/>
-          </a:xfrm>
-          <a:prstGeom prst="rect">
-            <a:avLst/>
-          </a:prstGeom>
-        </p:spPr>
-      </p:pic>
-    </p:spTree>
-    <p:extLst>
-      <p:ext uri="{BB962C8B-B14F-4D97-AF65-F5344CB8AC3E}">
-        <p14:creationId xmlns:p14="http://schemas.microsoft.com/office/powerpoint/2010/main" val="3300619990"/>
       </p:ext>
     </p:extLst>
   </p:cSld>

</xml_diff>

<commit_message>
Last update by Nik on Saturday Afternoon
</commit_message>
<xml_diff>
--- a/Where to be to be Happy.pptx
+++ b/Where to be to be Happy.pptx
@@ -8311,7 +8311,7 @@
             <a:pPr lvl="1"/>
             <a:r>
               <a:rPr lang="en-US" dirty="0"/>
-              <a:t>One notebook to perform the data import cleaning and then export cleaned data</a:t>
+              <a:t>One notebook to perform the data import, cleaning and then export cleaned data</a:t>
             </a:r>
           </a:p>
           <a:p>
@@ -8535,10 +8535,10 @@
       </p:sp>
       <p:pic>
         <p:nvPicPr>
-          <p:cNvPr id="5" name="Picture 4">
+          <p:cNvPr id="6" name="Picture 5">
             <a:extLst>
               <a:ext uri="{FF2B5EF4-FFF2-40B4-BE49-F238E27FC236}">
-                <a16:creationId xmlns:a16="http://schemas.microsoft.com/office/drawing/2014/main" id="{D892EAAD-F862-451F-9A43-FB99CFBE2618}"/>
+                <a16:creationId xmlns:a16="http://schemas.microsoft.com/office/drawing/2014/main" id="{4F1A7E1E-B9D5-4A8B-9B6F-FF47C00A894C}"/>
               </a:ext>
             </a:extLst>
           </p:cNvPr>
@@ -8555,8 +8555,8 @@
         </p:blipFill>
         <p:spPr>
           <a:xfrm>
-            <a:off x="2308190" y="1820120"/>
-            <a:ext cx="9477444" cy="2424130"/>
+            <a:off x="1601423" y="1758322"/>
+            <a:ext cx="9391719" cy="2538431"/>
           </a:xfrm>
           <a:prstGeom prst="rect">
             <a:avLst/>
@@ -8565,10 +8565,10 @@
       </p:pic>
       <p:pic>
         <p:nvPicPr>
-          <p:cNvPr id="9" name="Picture 8">
+          <p:cNvPr id="7" name="Picture 6">
             <a:extLst>
               <a:ext uri="{FF2B5EF4-FFF2-40B4-BE49-F238E27FC236}">
-                <a16:creationId xmlns:a16="http://schemas.microsoft.com/office/drawing/2014/main" id="{780163FB-C578-4006-82B6-8723CE48C102}"/>
+                <a16:creationId xmlns:a16="http://schemas.microsoft.com/office/drawing/2014/main" id="{E9E54E47-54FF-44A8-A2EB-515323829D87}"/>
               </a:ext>
             </a:extLst>
           </p:cNvPr>
@@ -8585,8 +8585,8 @@
         </p:blipFill>
         <p:spPr>
           <a:xfrm>
-            <a:off x="2322477" y="4244250"/>
-            <a:ext cx="9463157" cy="2414605"/>
+            <a:off x="1634761" y="4296753"/>
+            <a:ext cx="9358381" cy="2543194"/>
           </a:xfrm>
           <a:prstGeom prst="rect">
             <a:avLst/>
@@ -8689,10 +8689,10 @@
       </p:sp>
       <p:pic>
         <p:nvPicPr>
-          <p:cNvPr id="6" name="Picture 5">
+          <p:cNvPr id="11" name="Picture 10">
             <a:extLst>
               <a:ext uri="{FF2B5EF4-FFF2-40B4-BE49-F238E27FC236}">
-                <a16:creationId xmlns:a16="http://schemas.microsoft.com/office/drawing/2014/main" id="{85BDD27D-EB3C-41C3-9196-A22213AC60DE}"/>
+                <a16:creationId xmlns:a16="http://schemas.microsoft.com/office/drawing/2014/main" id="{157C8820-4202-4DB1-A390-9C4E68042495}"/>
               </a:ext>
             </a:extLst>
           </p:cNvPr>
@@ -8709,8 +8709,8 @@
         </p:blipFill>
         <p:spPr>
           <a:xfrm>
-            <a:off x="1460795" y="1784230"/>
-            <a:ext cx="9477444" cy="2633682"/>
+            <a:off x="1412046" y="1745734"/>
+            <a:ext cx="9367906" cy="2662257"/>
           </a:xfrm>
           <a:prstGeom prst="rect">
             <a:avLst/>
@@ -8719,10 +8719,10 @@
       </p:pic>
       <p:pic>
         <p:nvPicPr>
-          <p:cNvPr id="8" name="Picture 7">
+          <p:cNvPr id="13" name="Picture 12">
             <a:extLst>
               <a:ext uri="{FF2B5EF4-FFF2-40B4-BE49-F238E27FC236}">
-                <a16:creationId xmlns:a16="http://schemas.microsoft.com/office/drawing/2014/main" id="{ACB233A9-BBAA-4579-82FB-A0F197118B0E}"/>
+                <a16:creationId xmlns:a16="http://schemas.microsoft.com/office/drawing/2014/main" id="{6CD28D9F-588A-48E9-BB3E-08430BDBFB73}"/>
               </a:ext>
             </a:extLst>
           </p:cNvPr>
@@ -8739,8 +8739,8 @@
         </p:blipFill>
         <p:spPr>
           <a:xfrm>
-            <a:off x="1463176" y="4205268"/>
-            <a:ext cx="9472682" cy="2652732"/>
+            <a:off x="1397759" y="4248724"/>
+            <a:ext cx="9396481" cy="2662257"/>
           </a:xfrm>
           <a:prstGeom prst="rect">
             <a:avLst/>

</xml_diff>